<commit_message>
small changes in presentation
</commit_message>
<xml_diff>
--- a/report/WaterLevelSensor.pptx
+++ b/report/WaterLevelSensor.pptx
@@ -112,6 +112,11 @@
       </a:defRPr>
     </a:lvl9pPr>
   </p:defaultTextStyle>
+  <p:extLst>
+    <p:ext uri="{EFAFB233-063F-42B5-8137-9DF3F51BA10A}">
+      <p15:sldGuideLst xmlns:p15="http://schemas.microsoft.com/office/powerpoint/2012/main"/>
+    </p:ext>
+  </p:extLst>
 </p:presentation>
 </file>
 
@@ -4027,21 +4032,29 @@
           <a:p>
             <a:r>
               <a:rPr lang="ru-RU" dirty="0"/>
-              <a:t>Предназначен для определения уровня воды</a:t>
+              <a:t>Предназначен для определения уровня </a:t>
+            </a:r>
+            <a:br>
+              <a:rPr lang="en-US" dirty="0"/>
+            </a:br>
+            <a:r>
+              <a:rPr lang="ru-RU" dirty="0"/>
+              <a:t>воды</a:t>
+            </a:r>
+            <a:r>
+              <a:rPr lang="en-US" dirty="0"/>
+              <a:t> </a:t>
+            </a:r>
+            <a:r>
+              <a:rPr lang="ru-RU" dirty="0"/>
+              <a:t>в труднодоступных местах, </a:t>
             </a:r>
             <a:br>
               <a:rPr lang="ru-RU" dirty="0"/>
             </a:br>
             <a:r>
               <a:rPr lang="ru-RU" dirty="0"/>
-              <a:t>в труднодоступных местах, в которых нет </a:t>
-            </a:r>
-            <a:br>
-              <a:rPr lang="ru-RU" dirty="0"/>
-            </a:br>
-            <a:r>
-              <a:rPr lang="ru-RU" dirty="0"/>
-              <a:t>доступа к визуальной оценке</a:t>
+              <a:t>в которых нет доступа к визуальной оценке</a:t>
             </a:r>
           </a:p>
           <a:p>
@@ -4219,7 +4232,7 @@
           <a:p>
             <a:r>
               <a:rPr lang="ru-RU" dirty="0"/>
-              <a:t>Передаёт значение через аналоговый выход</a:t>
+              <a:t>Передает значение через аналоговый выход</a:t>
             </a:r>
           </a:p>
         </p:txBody>
@@ -4887,9 +4900,16 @@
             <p:ph idx="1"/>
           </p:nvPr>
         </p:nvSpPr>
-        <p:spPr/>
-        <p:txBody>
-          <a:bodyPr numCol="2"/>
+        <p:spPr>
+          <a:xfrm>
+            <a:off x="1371600" y="2286000"/>
+            <a:ext cx="9601200" cy="3886200"/>
+          </a:xfrm>
+        </p:spPr>
+        <p:txBody>
+          <a:bodyPr numCol="1">
+            <a:normAutofit/>
+          </a:bodyPr>
           <a:lstStyle/>
           <a:p>
             <a:pPr marL="0" indent="0">
@@ -4923,11 +4943,9 @@
               <a:rPr lang="ru-RU" dirty="0"/>
               <a:t>Возможность использования в разных направлениях и для разных задач</a:t>
             </a:r>
-          </a:p>
-          <a:p>
-            <a:endParaRPr lang="ru-RU" dirty="0"/>
-          </a:p>
-          <a:p>
+            <a:br>
+              <a:rPr lang="ru-RU" dirty="0"/>
+            </a:br>
             <a:endParaRPr lang="ru-RU" dirty="0"/>
           </a:p>
           <a:p>
@@ -5030,7 +5048,7 @@
         <p:spPr>
           <a:xfrm>
             <a:off x="1371600" y="2286000"/>
-            <a:ext cx="5162364" cy="3581400"/>
+            <a:ext cx="4159188" cy="3581400"/>
           </a:xfrm>
         </p:spPr>
         <p:txBody>
@@ -5085,8 +5103,8 @@
         </p:blipFill>
         <p:spPr bwMode="auto">
           <a:xfrm>
-            <a:off x="6096000" y="1564918"/>
-            <a:ext cx="5557881" cy="4302482"/>
+            <a:off x="5530788" y="1085665"/>
+            <a:ext cx="6054169" cy="4686670"/>
           </a:xfrm>
           <a:prstGeom prst="rect">
             <a:avLst/>

</xml_diff>